<commit_message>
Novas versoes de Material
</commit_message>
<xml_diff>
--- a/CCT0686_PARADIGMAS_DE_LINGUAGENS_DE_PROGRAMACAO/CCT0656_PARADIGMAS_L_PROGI_Aula_01 - PA1_PA2.pptx
+++ b/CCT0686_PARADIGMAS_DE_LINGUAGENS_DE_PROGRAMACAO/CCT0656_PARADIGMAS_L_PROGI_Aula_01 - PA1_PA2.pptx
@@ -225,7 +225,7 @@
           <a:p>
             <a:fld id="{0D6042A3-0B4D-4B7E-B5DF-C74B5157F851}" type="datetimeFigureOut">
               <a:rPr lang="pt-BR" smtClean="0"/>
-              <a:t>30/12/2018</a:t>
+              <a:t>15/01/2019</a:t>
             </a:fld>
             <a:endParaRPr lang="pt-BR"/>
           </a:p>
@@ -402,7 +402,7 @@
           <a:p>
             <a:fld id="{C8D94D05-F877-4447-A135-C5020AC71E43}" type="datetimeFigureOut">
               <a:rPr lang="pt-BR" smtClean="0"/>
-              <a:t>30/12/2018</a:t>
+              <a:t>15/01/2019</a:t>
             </a:fld>
             <a:endParaRPr lang="pt-BR"/>
           </a:p>
@@ -6051,7 +6051,7 @@
         </p:spPr>
         <p:txBody>
           <a:bodyPr>
-            <a:normAutofit/>
+            <a:normAutofit lnSpcReduction="10000"/>
           </a:bodyPr>
           <a:lstStyle/>
           <a:p>
@@ -6064,6 +6064,21 @@
             <a:pPr lvl="1"/>
             <a:r>
               <a:rPr lang="pt-BR" dirty="0"/>
+              <a:t>SEBESTA, Robert W. </a:t>
+            </a:r>
+            <a:r>
+              <a:rPr lang="pt-BR" b="1" dirty="0"/>
+              <a:t>Conceitos de Linguagens de Programação</a:t>
+            </a:r>
+            <a:r>
+              <a:rPr lang="pt-BR" dirty="0"/>
+              <a:t>. 11. edição. Porto Alegre: Bookman, 2018</a:t>
+            </a:r>
+          </a:p>
+          <a:p>
+            <a:pPr lvl="1"/>
+            <a:r>
+              <a:rPr lang="pt-BR" dirty="0"/>
               <a:t>SCENCIO, Ana Fernanda Gomes. </a:t>
             </a:r>
             <a:r>
@@ -6072,8 +6087,23 @@
             </a:r>
             <a:r>
               <a:rPr lang="pt-BR" dirty="0"/>
-              <a:t>(Biblioteca Virtual). 3ª edição. São Paulo: Pearson, 2012.</a:t>
-            </a:r>
+              <a:t>(Biblioteca Virtual). 3ª edição. São Paulo: Pearson, 2012. </a:t>
+            </a:r>
+            <a:r>
+              <a:rPr lang="pt-BR" dirty="0">
+                <a:hlinkClick r:id="rId2"/>
+              </a:rPr>
+              <a:t>https://bv4.digitalpages.com.br/?term=Fundamentos%2520%2520da%2520programa%25C3%25A7%25C3%25A3o&amp;searchpage=1&amp;filtro=todos#/busca</a:t>
+            </a:r>
+            <a:endParaRPr lang="pt-BR" dirty="0"/>
+          </a:p>
+          <a:p>
+            <a:pPr lvl="1"/>
+            <a:endParaRPr lang="pt-BR" dirty="0"/>
+          </a:p>
+          <a:p>
+            <a:pPr lvl="1"/>
+            <a:endParaRPr lang="pt-BR" dirty="0"/>
           </a:p>
           <a:p>
             <a:pPr lvl="1"/>

</xml_diff>